<commit_message>
😎 Agregado diagrama de la API y pruebas del despliegue
</commit_message>
<xml_diff>
--- a/01 Documentos Entrega/04 Diagrama Arquitectura.pptx
+++ b/01 Documentos Entrega/04 Diagrama Arquitectura.pptx
@@ -5,10 +5,11 @@
     <p:sldMasterId id="2147483648" r:id="rId1"/>
   </p:sldMasterIdLst>
   <p:notesMasterIdLst>
-    <p:notesMasterId r:id="rId3"/>
+    <p:notesMasterId r:id="rId4"/>
   </p:notesMasterIdLst>
   <p:sldIdLst>
     <p:sldId id="256" r:id="rId2"/>
+    <p:sldId id="257" r:id="rId3"/>
   </p:sldIdLst>
   <p:sldSz cx="12192000" cy="6858000"/>
   <p:notesSz cx="6858000" cy="9144000"/>
@@ -118,7 +119,7 @@
 <file path=ppt/revisionInfo.xml><?xml version="1.0" encoding="utf-8"?>
 <p1510:revInfo xmlns:a="http://schemas.openxmlformats.org/drawingml/2006/main" xmlns:r="http://schemas.openxmlformats.org/officeDocument/2006/relationships" xmlns:p1510="http://schemas.microsoft.com/office/powerpoint/2015/10/main">
   <p1510:revLst>
-    <p1510:client id="{D30BC810-B9FE-F74A-A902-CABF1C3D675E}" v="116" dt="2024-10-20T14:19:28.581"/>
+    <p1510:client id="{FD3F4B60-226F-9F48-A011-7609F9D97FC7}" v="39" dt="2024-10-20T20:37:46.879"/>
   </p1510:revLst>
 </p1510:revInfo>
 </file>
@@ -5423,6 +5424,895 @@
     <p:extLst>
       <p:ext uri="{BB962C8B-B14F-4D97-AF65-F5344CB8AC3E}">
         <p14:creationId xmlns:p14="http://schemas.microsoft.com/office/powerpoint/2010/main" val="625379029"/>
+      </p:ext>
+    </p:extLst>
+  </p:cSld>
+  <p:clrMapOvr>
+    <a:masterClrMapping/>
+  </p:clrMapOvr>
+</p:sld>
+</file>
+
+<file path=ppt/slides/slide2.xml><?xml version="1.0" encoding="utf-8"?>
+<p:sld xmlns:a="http://schemas.openxmlformats.org/drawingml/2006/main" xmlns:r="http://schemas.openxmlformats.org/officeDocument/2006/relationships" xmlns:p="http://schemas.openxmlformats.org/presentationml/2006/main">
+  <p:cSld>
+    <p:spTree>
+      <p:nvGrpSpPr>
+        <p:cNvPr id="1" name=""/>
+        <p:cNvGrpSpPr/>
+        <p:nvPr/>
+      </p:nvGrpSpPr>
+      <p:grpSpPr>
+        <a:xfrm>
+          <a:off x="0" y="0"/>
+          <a:ext cx="0" cy="0"/>
+          <a:chOff x="0" y="0"/>
+          <a:chExt cx="0" cy="0"/>
+        </a:xfrm>
+      </p:grpSpPr>
+      <p:grpSp>
+        <p:nvGrpSpPr>
+          <p:cNvPr id="17" name="Group 16">
+            <a:extLst>
+              <a:ext uri="{FF2B5EF4-FFF2-40B4-BE49-F238E27FC236}">
+                <a16:creationId xmlns:a16="http://schemas.microsoft.com/office/drawing/2014/main" id="{993F2ACB-4AA4-1F95-1515-8CAA2F2A1728}"/>
+              </a:ext>
+            </a:extLst>
+          </p:cNvPr>
+          <p:cNvGrpSpPr/>
+          <p:nvPr/>
+        </p:nvGrpSpPr>
+        <p:grpSpPr>
+          <a:xfrm>
+            <a:off x="3487065" y="663048"/>
+            <a:ext cx="2121408" cy="804672"/>
+            <a:chOff x="3487065" y="663048"/>
+            <a:chExt cx="2121408" cy="804672"/>
+          </a:xfrm>
+        </p:grpSpPr>
+        <p:sp>
+          <p:nvSpPr>
+            <p:cNvPr id="8" name="Rectángulo 5">
+              <a:extLst>
+                <a:ext uri="{FF2B5EF4-FFF2-40B4-BE49-F238E27FC236}">
+                  <a16:creationId xmlns:a16="http://schemas.microsoft.com/office/drawing/2014/main" id="{5B819B1F-0A56-A192-06EA-06DC0334BA3E}"/>
+                </a:ext>
+              </a:extLst>
+            </p:cNvPr>
+            <p:cNvSpPr/>
+            <p:nvPr/>
+          </p:nvSpPr>
+          <p:spPr>
+            <a:xfrm>
+              <a:off x="3487065" y="663048"/>
+              <a:ext cx="2121408" cy="804672"/>
+            </a:xfrm>
+            <a:prstGeom prst="rect">
+              <a:avLst/>
+            </a:prstGeom>
+            <a:noFill/>
+            <a:ln>
+              <a:solidFill>
+                <a:schemeClr val="tx1"/>
+              </a:solidFill>
+            </a:ln>
+          </p:spPr>
+          <p:style>
+            <a:lnRef idx="2">
+              <a:schemeClr val="accent1">
+                <a:shade val="15000"/>
+              </a:schemeClr>
+            </a:lnRef>
+            <a:fillRef idx="1">
+              <a:schemeClr val="accent1"/>
+            </a:fillRef>
+            <a:effectRef idx="0">
+              <a:schemeClr val="accent1"/>
+            </a:effectRef>
+            <a:fontRef idx="minor">
+              <a:schemeClr val="lt1"/>
+            </a:fontRef>
+          </p:style>
+          <p:txBody>
+            <a:bodyPr rtlCol="0" anchor="ctr"/>
+            <a:lstStyle/>
+            <a:p>
+              <a:pPr algn="ctr"/>
+              <a:endParaRPr lang="es-MX"/>
+            </a:p>
+          </p:txBody>
+        </p:sp>
+        <p:sp>
+          <p:nvSpPr>
+            <p:cNvPr id="10" name="TextBox 9">
+              <a:extLst>
+                <a:ext uri="{FF2B5EF4-FFF2-40B4-BE49-F238E27FC236}">
+                  <a16:creationId xmlns:a16="http://schemas.microsoft.com/office/drawing/2014/main" id="{55070656-3D73-9535-4D10-420ED26D3489}"/>
+                </a:ext>
+              </a:extLst>
+            </p:cNvPr>
+            <p:cNvSpPr txBox="1"/>
+            <p:nvPr/>
+          </p:nvSpPr>
+          <p:spPr>
+            <a:xfrm>
+              <a:off x="3855939" y="742219"/>
+              <a:ext cx="1316673" cy="646331"/>
+            </a:xfrm>
+            <a:prstGeom prst="rect">
+              <a:avLst/>
+            </a:prstGeom>
+            <a:noFill/>
+          </p:spPr>
+          <p:txBody>
+            <a:bodyPr wrap="square" rtlCol="0">
+              <a:spAutoFit/>
+            </a:bodyPr>
+            <a:lstStyle/>
+            <a:p>
+              <a:pPr algn="ctr"/>
+              <a:r>
+                <a:rPr lang="es-ES_tradnl" dirty="0" err="1"/>
+                <a:t>Parquets</a:t>
+              </a:r>
+              <a:endParaRPr lang="es-ES_tradnl" dirty="0"/>
+            </a:p>
+            <a:p>
+              <a:pPr algn="ctr"/>
+              <a:r>
+                <a:rPr lang="es-ES_tradnl" dirty="0"/>
+                <a:t>NYC</a:t>
+              </a:r>
+            </a:p>
+          </p:txBody>
+        </p:sp>
+      </p:grpSp>
+      <p:cxnSp>
+        <p:nvCxnSpPr>
+          <p:cNvPr id="11" name="Conector recto de flecha 23">
+            <a:extLst>
+              <a:ext uri="{FF2B5EF4-FFF2-40B4-BE49-F238E27FC236}">
+                <a16:creationId xmlns:a16="http://schemas.microsoft.com/office/drawing/2014/main" id="{60777230-C86D-8225-15D6-FEFBB9328094}"/>
+              </a:ext>
+            </a:extLst>
+          </p:cNvPr>
+          <p:cNvCxnSpPr>
+            <a:cxnSpLocks/>
+            <a:stCxn id="8" idx="2"/>
+          </p:cNvCxnSpPr>
+          <p:nvPr/>
+        </p:nvCxnSpPr>
+        <p:spPr>
+          <a:xfrm>
+            <a:off x="4547769" y="1467720"/>
+            <a:ext cx="0" cy="672579"/>
+          </a:xfrm>
+          <a:prstGeom prst="straightConnector1">
+            <a:avLst/>
+          </a:prstGeom>
+          <a:ln>
+            <a:tailEnd type="triangle"/>
+          </a:ln>
+        </p:spPr>
+        <p:style>
+          <a:lnRef idx="2">
+            <a:schemeClr val="accent1"/>
+          </a:lnRef>
+          <a:fillRef idx="0">
+            <a:schemeClr val="accent1"/>
+          </a:fillRef>
+          <a:effectRef idx="1">
+            <a:schemeClr val="accent1"/>
+          </a:effectRef>
+          <a:fontRef idx="minor">
+            <a:schemeClr val="tx1"/>
+          </a:fontRef>
+        </p:style>
+      </p:cxnSp>
+      <p:grpSp>
+        <p:nvGrpSpPr>
+          <p:cNvPr id="15" name="Group 14">
+            <a:extLst>
+              <a:ext uri="{FF2B5EF4-FFF2-40B4-BE49-F238E27FC236}">
+                <a16:creationId xmlns:a16="http://schemas.microsoft.com/office/drawing/2014/main" id="{C838ED66-ACE6-4703-7609-E79427A17394}"/>
+              </a:ext>
+            </a:extLst>
+          </p:cNvPr>
+          <p:cNvGrpSpPr/>
+          <p:nvPr/>
+        </p:nvGrpSpPr>
+        <p:grpSpPr>
+          <a:xfrm>
+            <a:off x="3496308" y="4388966"/>
+            <a:ext cx="2121408" cy="804672"/>
+            <a:chOff x="3497342" y="2701190"/>
+            <a:chExt cx="2121408" cy="804672"/>
+          </a:xfrm>
+        </p:grpSpPr>
+        <p:grpSp>
+          <p:nvGrpSpPr>
+            <p:cNvPr id="4" name="Grupo 33">
+              <a:extLst>
+                <a:ext uri="{FF2B5EF4-FFF2-40B4-BE49-F238E27FC236}">
+                  <a16:creationId xmlns:a16="http://schemas.microsoft.com/office/drawing/2014/main" id="{B8DE945A-C993-13ED-834B-E13970B1CE59}"/>
+                </a:ext>
+              </a:extLst>
+            </p:cNvPr>
+            <p:cNvGrpSpPr/>
+            <p:nvPr/>
+          </p:nvGrpSpPr>
+          <p:grpSpPr>
+            <a:xfrm>
+              <a:off x="3497342" y="2701190"/>
+              <a:ext cx="2121408" cy="804672"/>
+              <a:chOff x="2075687" y="621792"/>
+              <a:chExt cx="2121408" cy="804672"/>
+            </a:xfrm>
+          </p:grpSpPr>
+          <p:sp>
+            <p:nvSpPr>
+              <p:cNvPr id="5" name="Rectángulo 5">
+                <a:extLst>
+                  <a:ext uri="{FF2B5EF4-FFF2-40B4-BE49-F238E27FC236}">
+                    <a16:creationId xmlns:a16="http://schemas.microsoft.com/office/drawing/2014/main" id="{BB28A84C-4A3C-6311-1A26-9888370A5FAD}"/>
+                  </a:ext>
+                </a:extLst>
+              </p:cNvPr>
+              <p:cNvSpPr/>
+              <p:nvPr/>
+            </p:nvSpPr>
+            <p:spPr>
+              <a:xfrm>
+                <a:off x="2075687" y="621792"/>
+                <a:ext cx="2121408" cy="804672"/>
+              </a:xfrm>
+              <a:prstGeom prst="rect">
+                <a:avLst/>
+              </a:prstGeom>
+              <a:noFill/>
+              <a:ln>
+                <a:solidFill>
+                  <a:schemeClr val="tx1"/>
+                </a:solidFill>
+              </a:ln>
+            </p:spPr>
+            <p:style>
+              <a:lnRef idx="2">
+                <a:schemeClr val="accent1">
+                  <a:shade val="15000"/>
+                </a:schemeClr>
+              </a:lnRef>
+              <a:fillRef idx="1">
+                <a:schemeClr val="accent1"/>
+              </a:fillRef>
+              <a:effectRef idx="0">
+                <a:schemeClr val="accent1"/>
+              </a:effectRef>
+              <a:fontRef idx="minor">
+                <a:schemeClr val="lt1"/>
+              </a:fontRef>
+            </p:style>
+            <p:txBody>
+              <a:bodyPr rtlCol="0" anchor="ctr"/>
+              <a:lstStyle/>
+              <a:p>
+                <a:pPr algn="ctr"/>
+                <a:endParaRPr lang="es-MX"/>
+              </a:p>
+            </p:txBody>
+          </p:sp>
+          <p:pic>
+            <p:nvPicPr>
+              <p:cNvPr id="6" name="Picture 2" descr="GitHub - StartupUtils/FastAPI_MongoDB: Fast API MongoDB Template">
+                <a:extLst>
+                  <a:ext uri="{FF2B5EF4-FFF2-40B4-BE49-F238E27FC236}">
+                    <a16:creationId xmlns:a16="http://schemas.microsoft.com/office/drawing/2014/main" id="{B0861CC0-C0A5-9367-E85D-AEFEDCB7FEA2}"/>
+                  </a:ext>
+                </a:extLst>
+              </p:cNvPr>
+              <p:cNvPicPr>
+                <a:picLocks noChangeAspect="1" noChangeArrowheads="1"/>
+              </p:cNvPicPr>
+              <p:nvPr/>
+            </p:nvPicPr>
+            <p:blipFill>
+              <a:blip r:embed="rId2">
+                <a:extLst>
+                  <a:ext uri="{28A0092B-C50C-407E-A947-70E740481C1C}">
+                    <a14:useLocalDpi xmlns:a14="http://schemas.microsoft.com/office/drawing/2010/main" val="0"/>
+                  </a:ext>
+                </a:extLst>
+              </a:blip>
+              <a:srcRect/>
+              <a:stretch>
+                <a:fillRect/>
+              </a:stretch>
+            </p:blipFill>
+            <p:spPr bwMode="auto">
+              <a:xfrm>
+                <a:off x="2155842" y="690996"/>
+                <a:ext cx="729901" cy="161899"/>
+              </a:xfrm>
+              <a:prstGeom prst="rect">
+                <a:avLst/>
+              </a:prstGeom>
+              <a:noFill/>
+              <a:extLst>
+                <a:ext uri="{909E8E84-426E-40DD-AFC4-6F175D3DCCD1}">
+                  <a14:hiddenFill xmlns:a14="http://schemas.microsoft.com/office/drawing/2010/main">
+                    <a:solidFill>
+                      <a:srgbClr val="FFFFFF"/>
+                    </a:solidFill>
+                  </a14:hiddenFill>
+                </a:ext>
+              </a:extLst>
+            </p:spPr>
+          </p:pic>
+        </p:grpSp>
+        <p:sp>
+          <p:nvSpPr>
+            <p:cNvPr id="14" name="TextBox 13">
+              <a:extLst>
+                <a:ext uri="{FF2B5EF4-FFF2-40B4-BE49-F238E27FC236}">
+                  <a16:creationId xmlns:a16="http://schemas.microsoft.com/office/drawing/2014/main" id="{1BA0F35B-A19F-E90A-F5DD-876CEEC108CF}"/>
+                </a:ext>
+              </a:extLst>
+            </p:cNvPr>
+            <p:cNvSpPr txBox="1"/>
+            <p:nvPr/>
+          </p:nvSpPr>
+          <p:spPr>
+            <a:xfrm>
+              <a:off x="3942447" y="2963604"/>
+              <a:ext cx="1316673" cy="369332"/>
+            </a:xfrm>
+            <a:prstGeom prst="rect">
+              <a:avLst/>
+            </a:prstGeom>
+            <a:noFill/>
+          </p:spPr>
+          <p:txBody>
+            <a:bodyPr wrap="square" rtlCol="0">
+              <a:spAutoFit/>
+            </a:bodyPr>
+            <a:lstStyle/>
+            <a:p>
+              <a:pPr algn="ctr"/>
+              <a:r>
+                <a:rPr lang="es-ES_tradnl" dirty="0"/>
+                <a:t>API Demo</a:t>
+              </a:r>
+            </a:p>
+          </p:txBody>
+        </p:sp>
+      </p:grpSp>
+      <p:grpSp>
+        <p:nvGrpSpPr>
+          <p:cNvPr id="18" name="Group 17">
+            <a:extLst>
+              <a:ext uri="{FF2B5EF4-FFF2-40B4-BE49-F238E27FC236}">
+                <a16:creationId xmlns:a16="http://schemas.microsoft.com/office/drawing/2014/main" id="{CD4F098B-6AE0-3545-1FA4-46F012088F40}"/>
+              </a:ext>
+            </a:extLst>
+          </p:cNvPr>
+          <p:cNvGrpSpPr/>
+          <p:nvPr/>
+        </p:nvGrpSpPr>
+        <p:grpSpPr>
+          <a:xfrm>
+            <a:off x="3487065" y="2127943"/>
+            <a:ext cx="2121408" cy="631746"/>
+            <a:chOff x="3487065" y="663048"/>
+            <a:chExt cx="2121408" cy="804672"/>
+          </a:xfrm>
+        </p:grpSpPr>
+        <p:sp>
+          <p:nvSpPr>
+            <p:cNvPr id="19" name="Rectángulo 5">
+              <a:extLst>
+                <a:ext uri="{FF2B5EF4-FFF2-40B4-BE49-F238E27FC236}">
+                  <a16:creationId xmlns:a16="http://schemas.microsoft.com/office/drawing/2014/main" id="{4F724EB5-4901-4DE9-CFB9-7A514342CFFB}"/>
+                </a:ext>
+              </a:extLst>
+            </p:cNvPr>
+            <p:cNvSpPr/>
+            <p:nvPr/>
+          </p:nvSpPr>
+          <p:spPr>
+            <a:xfrm>
+              <a:off x="3487065" y="663048"/>
+              <a:ext cx="2121408" cy="804672"/>
+            </a:xfrm>
+            <a:prstGeom prst="rect">
+              <a:avLst/>
+            </a:prstGeom>
+            <a:noFill/>
+            <a:ln>
+              <a:solidFill>
+                <a:schemeClr val="tx1"/>
+              </a:solidFill>
+            </a:ln>
+          </p:spPr>
+          <p:style>
+            <a:lnRef idx="2">
+              <a:schemeClr val="accent1">
+                <a:shade val="15000"/>
+              </a:schemeClr>
+            </a:lnRef>
+            <a:fillRef idx="1">
+              <a:schemeClr val="accent1"/>
+            </a:fillRef>
+            <a:effectRef idx="0">
+              <a:schemeClr val="accent1"/>
+            </a:effectRef>
+            <a:fontRef idx="minor">
+              <a:schemeClr val="lt1"/>
+            </a:fontRef>
+          </p:style>
+          <p:txBody>
+            <a:bodyPr rtlCol="0" anchor="ctr"/>
+            <a:lstStyle/>
+            <a:p>
+              <a:pPr algn="ctr"/>
+              <a:endParaRPr lang="es-MX"/>
+            </a:p>
+          </p:txBody>
+        </p:sp>
+        <p:sp>
+          <p:nvSpPr>
+            <p:cNvPr id="20" name="TextBox 19">
+              <a:extLst>
+                <a:ext uri="{FF2B5EF4-FFF2-40B4-BE49-F238E27FC236}">
+                  <a16:creationId xmlns:a16="http://schemas.microsoft.com/office/drawing/2014/main" id="{42837E8B-A2DE-3F09-03B4-A44E0009E5A3}"/>
+                </a:ext>
+              </a:extLst>
+            </p:cNvPr>
+            <p:cNvSpPr txBox="1"/>
+            <p:nvPr/>
+          </p:nvSpPr>
+          <p:spPr>
+            <a:xfrm>
+              <a:off x="3898676" y="747859"/>
+              <a:ext cx="1316673" cy="369332"/>
+            </a:xfrm>
+            <a:prstGeom prst="rect">
+              <a:avLst/>
+            </a:prstGeom>
+            <a:noFill/>
+          </p:spPr>
+          <p:txBody>
+            <a:bodyPr wrap="square" rtlCol="0">
+              <a:spAutoFit/>
+            </a:bodyPr>
+            <a:lstStyle/>
+            <a:p>
+              <a:pPr algn="ctr"/>
+              <a:r>
+                <a:rPr lang="es-ES_tradnl" dirty="0" err="1"/>
+                <a:t>Extract</a:t>
+              </a:r>
+              <a:endParaRPr lang="es-ES_tradnl" dirty="0"/>
+            </a:p>
+          </p:txBody>
+        </p:sp>
+      </p:grpSp>
+      <p:pic>
+        <p:nvPicPr>
+          <p:cNvPr id="2050" name="Picture 2">
+            <a:extLst>
+              <a:ext uri="{FF2B5EF4-FFF2-40B4-BE49-F238E27FC236}">
+                <a16:creationId xmlns:a16="http://schemas.microsoft.com/office/drawing/2014/main" id="{904BAE2D-8B16-C79C-66BD-D487BE6CEE10}"/>
+              </a:ext>
+            </a:extLst>
+          </p:cNvPr>
+          <p:cNvPicPr>
+            <a:picLocks noChangeAspect="1" noChangeArrowheads="1"/>
+          </p:cNvPicPr>
+          <p:nvPr/>
+        </p:nvPicPr>
+        <p:blipFill>
+          <a:blip r:embed="rId3">
+            <a:extLst>
+              <a:ext uri="{28A0092B-C50C-407E-A947-70E740481C1C}">
+                <a14:useLocalDpi xmlns:a14="http://schemas.microsoft.com/office/drawing/2010/main" val="0"/>
+              </a:ext>
+            </a:extLst>
+          </a:blip>
+          <a:srcRect/>
+          <a:stretch>
+            <a:fillRect/>
+          </a:stretch>
+        </p:blipFill>
+        <p:spPr bwMode="auto">
+          <a:xfrm>
+            <a:off x="3655095" y="2299536"/>
+            <a:ext cx="386571" cy="424505"/>
+          </a:xfrm>
+          <a:prstGeom prst="rect">
+            <a:avLst/>
+          </a:prstGeom>
+          <a:noFill/>
+          <a:extLst>
+            <a:ext uri="{909E8E84-426E-40DD-AFC4-6F175D3DCCD1}">
+              <a14:hiddenFill xmlns:a14="http://schemas.microsoft.com/office/drawing/2010/main">
+                <a:solidFill>
+                  <a:srgbClr val="FFFFFF"/>
+                </a:solidFill>
+              </a14:hiddenFill>
+            </a:ext>
+          </a:extLst>
+        </p:spPr>
+      </p:pic>
+      <p:cxnSp>
+        <p:nvCxnSpPr>
+          <p:cNvPr id="21" name="Conector recto de flecha 23">
+            <a:extLst>
+              <a:ext uri="{FF2B5EF4-FFF2-40B4-BE49-F238E27FC236}">
+                <a16:creationId xmlns:a16="http://schemas.microsoft.com/office/drawing/2014/main" id="{B35E8B16-F582-4267-BDC8-89029155C042}"/>
+              </a:ext>
+            </a:extLst>
+          </p:cNvPr>
+          <p:cNvCxnSpPr>
+            <a:cxnSpLocks/>
+          </p:cNvCxnSpPr>
+          <p:nvPr/>
+        </p:nvCxnSpPr>
+        <p:spPr>
+          <a:xfrm>
+            <a:off x="4547769" y="3892581"/>
+            <a:ext cx="0" cy="496385"/>
+          </a:xfrm>
+          <a:prstGeom prst="straightConnector1">
+            <a:avLst/>
+          </a:prstGeom>
+          <a:ln>
+            <a:tailEnd type="triangle"/>
+          </a:ln>
+        </p:spPr>
+        <p:style>
+          <a:lnRef idx="2">
+            <a:schemeClr val="accent1"/>
+          </a:lnRef>
+          <a:fillRef idx="0">
+            <a:schemeClr val="accent1"/>
+          </a:fillRef>
+          <a:effectRef idx="1">
+            <a:schemeClr val="accent1"/>
+          </a:effectRef>
+          <a:fontRef idx="minor">
+            <a:schemeClr val="tx1"/>
+          </a:fontRef>
+        </p:style>
+      </p:cxnSp>
+      <p:cxnSp>
+        <p:nvCxnSpPr>
+          <p:cNvPr id="22" name="Conector recto de flecha 23">
+            <a:extLst>
+              <a:ext uri="{FF2B5EF4-FFF2-40B4-BE49-F238E27FC236}">
+                <a16:creationId xmlns:a16="http://schemas.microsoft.com/office/drawing/2014/main" id="{B781CFDA-1855-E841-149C-658DFB55ABF1}"/>
+              </a:ext>
+            </a:extLst>
+          </p:cNvPr>
+          <p:cNvCxnSpPr>
+            <a:cxnSpLocks/>
+          </p:cNvCxnSpPr>
+          <p:nvPr/>
+        </p:nvCxnSpPr>
+        <p:spPr>
+          <a:xfrm>
+            <a:off x="4521058" y="5193638"/>
+            <a:ext cx="0" cy="672579"/>
+          </a:xfrm>
+          <a:prstGeom prst="straightConnector1">
+            <a:avLst/>
+          </a:prstGeom>
+          <a:ln>
+            <a:tailEnd type="triangle"/>
+          </a:ln>
+        </p:spPr>
+        <p:style>
+          <a:lnRef idx="2">
+            <a:schemeClr val="accent1"/>
+          </a:lnRef>
+          <a:fillRef idx="0">
+            <a:schemeClr val="accent1"/>
+          </a:fillRef>
+          <a:effectRef idx="1">
+            <a:schemeClr val="accent1"/>
+          </a:effectRef>
+          <a:fontRef idx="minor">
+            <a:schemeClr val="tx1"/>
+          </a:fontRef>
+        </p:style>
+      </p:cxnSp>
+      <p:sp>
+        <p:nvSpPr>
+          <p:cNvPr id="23" name="TextBox 22">
+            <a:extLst>
+              <a:ext uri="{FF2B5EF4-FFF2-40B4-BE49-F238E27FC236}">
+                <a16:creationId xmlns:a16="http://schemas.microsoft.com/office/drawing/2014/main" id="{E856B5B8-AB56-AE32-B094-21FF5744C617}"/>
+              </a:ext>
+            </a:extLst>
+          </p:cNvPr>
+          <p:cNvSpPr txBox="1"/>
+          <p:nvPr/>
+        </p:nvSpPr>
+        <p:spPr>
+          <a:xfrm>
+            <a:off x="3873712" y="5801996"/>
+            <a:ext cx="1316673" cy="646331"/>
+          </a:xfrm>
+          <a:prstGeom prst="rect">
+            <a:avLst/>
+          </a:prstGeom>
+          <a:noFill/>
+        </p:spPr>
+        <p:txBody>
+          <a:bodyPr wrap="square" rtlCol="0">
+            <a:spAutoFit/>
+          </a:bodyPr>
+          <a:lstStyle/>
+          <a:p>
+            <a:pPr algn="ctr"/>
+            <a:r>
+              <a:rPr lang="es-ES_tradnl" dirty="0" err="1"/>
+              <a:t>Metodos</a:t>
+            </a:r>
+            <a:r>
+              <a:rPr lang="es-ES_tradnl" dirty="0"/>
+              <a:t> GET y POST</a:t>
+            </a:r>
+          </a:p>
+        </p:txBody>
+      </p:sp>
+      <p:pic>
+        <p:nvPicPr>
+          <p:cNvPr id="24" name="Picture 8" descr="Docker Logo, symbol, meaning, history, PNG, brand">
+            <a:extLst>
+              <a:ext uri="{FF2B5EF4-FFF2-40B4-BE49-F238E27FC236}">
+                <a16:creationId xmlns:a16="http://schemas.microsoft.com/office/drawing/2014/main" id="{9884D81C-8F7F-C1C8-F4F6-41BFE9DA976E}"/>
+              </a:ext>
+            </a:extLst>
+          </p:cNvPr>
+          <p:cNvPicPr>
+            <a:picLocks noChangeAspect="1" noChangeArrowheads="1"/>
+          </p:cNvPicPr>
+          <p:nvPr/>
+        </p:nvPicPr>
+        <p:blipFill rotWithShape="1">
+          <a:blip r:embed="rId4">
+            <a:extLst>
+              <a:ext uri="{28A0092B-C50C-407E-A947-70E740481C1C}">
+                <a14:useLocalDpi xmlns:a14="http://schemas.microsoft.com/office/drawing/2010/main" val="0"/>
+              </a:ext>
+            </a:extLst>
+          </a:blip>
+          <a:srcRect l="18741" r="18741"/>
+          <a:stretch/>
+        </p:blipFill>
+        <p:spPr bwMode="auto">
+          <a:xfrm>
+            <a:off x="3578113" y="4786836"/>
+            <a:ext cx="363300" cy="326881"/>
+          </a:xfrm>
+          <a:prstGeom prst="rect">
+            <a:avLst/>
+          </a:prstGeom>
+          <a:noFill/>
+          <a:extLst>
+            <a:ext uri="{909E8E84-426E-40DD-AFC4-6F175D3DCCD1}">
+              <a14:hiddenFill xmlns:a14="http://schemas.microsoft.com/office/drawing/2010/main">
+                <a:solidFill>
+                  <a:srgbClr val="FFFFFF"/>
+                </a:solidFill>
+              </a14:hiddenFill>
+            </a:ext>
+          </a:extLst>
+        </p:spPr>
+      </p:pic>
+      <p:grpSp>
+        <p:nvGrpSpPr>
+          <p:cNvPr id="26" name="Group 25">
+            <a:extLst>
+              <a:ext uri="{FF2B5EF4-FFF2-40B4-BE49-F238E27FC236}">
+                <a16:creationId xmlns:a16="http://schemas.microsoft.com/office/drawing/2014/main" id="{1479CFD9-6C6A-03D2-C3A7-97EC678089AB}"/>
+              </a:ext>
+            </a:extLst>
+          </p:cNvPr>
+          <p:cNvGrpSpPr/>
+          <p:nvPr/>
+        </p:nvGrpSpPr>
+        <p:grpSpPr>
+          <a:xfrm>
+            <a:off x="3487065" y="3203916"/>
+            <a:ext cx="2121408" cy="631746"/>
+            <a:chOff x="3487065" y="663048"/>
+            <a:chExt cx="2121408" cy="804672"/>
+          </a:xfrm>
+        </p:grpSpPr>
+        <p:sp>
+          <p:nvSpPr>
+            <p:cNvPr id="27" name="Rectángulo 5">
+              <a:extLst>
+                <a:ext uri="{FF2B5EF4-FFF2-40B4-BE49-F238E27FC236}">
+                  <a16:creationId xmlns:a16="http://schemas.microsoft.com/office/drawing/2014/main" id="{A9B31FED-9336-C5BC-EAE7-5C7882C91A66}"/>
+                </a:ext>
+              </a:extLst>
+            </p:cNvPr>
+            <p:cNvSpPr/>
+            <p:nvPr/>
+          </p:nvSpPr>
+          <p:spPr>
+            <a:xfrm>
+              <a:off x="3487065" y="663048"/>
+              <a:ext cx="2121408" cy="804672"/>
+            </a:xfrm>
+            <a:prstGeom prst="rect">
+              <a:avLst/>
+            </a:prstGeom>
+            <a:noFill/>
+            <a:ln>
+              <a:solidFill>
+                <a:schemeClr val="tx1"/>
+              </a:solidFill>
+            </a:ln>
+          </p:spPr>
+          <p:style>
+            <a:lnRef idx="2">
+              <a:schemeClr val="accent1">
+                <a:shade val="15000"/>
+              </a:schemeClr>
+            </a:lnRef>
+            <a:fillRef idx="1">
+              <a:schemeClr val="accent1"/>
+            </a:fillRef>
+            <a:effectRef idx="0">
+              <a:schemeClr val="accent1"/>
+            </a:effectRef>
+            <a:fontRef idx="minor">
+              <a:schemeClr val="lt1"/>
+            </a:fontRef>
+          </p:style>
+          <p:txBody>
+            <a:bodyPr rtlCol="0" anchor="ctr"/>
+            <a:lstStyle/>
+            <a:p>
+              <a:pPr algn="ctr"/>
+              <a:endParaRPr lang="es-MX"/>
+            </a:p>
+          </p:txBody>
+        </p:sp>
+        <p:sp>
+          <p:nvSpPr>
+            <p:cNvPr id="28" name="TextBox 27">
+              <a:extLst>
+                <a:ext uri="{FF2B5EF4-FFF2-40B4-BE49-F238E27FC236}">
+                  <a16:creationId xmlns:a16="http://schemas.microsoft.com/office/drawing/2014/main" id="{E57D5B09-6D2F-93F7-58C7-7634FD0B7317}"/>
+                </a:ext>
+              </a:extLst>
+            </p:cNvPr>
+            <p:cNvSpPr txBox="1"/>
+            <p:nvPr/>
+          </p:nvSpPr>
+          <p:spPr>
+            <a:xfrm>
+              <a:off x="4189895" y="855567"/>
+              <a:ext cx="1316673" cy="470428"/>
+            </a:xfrm>
+            <a:prstGeom prst="rect">
+              <a:avLst/>
+            </a:prstGeom>
+            <a:noFill/>
+          </p:spPr>
+          <p:txBody>
+            <a:bodyPr wrap="square" rtlCol="0">
+              <a:spAutoFit/>
+            </a:bodyPr>
+            <a:lstStyle/>
+            <a:p>
+              <a:pPr algn="ctr"/>
+              <a:r>
+                <a:rPr lang="es-ES_tradnl" dirty="0"/>
+                <a:t>BD Local</a:t>
+              </a:r>
+            </a:p>
+          </p:txBody>
+        </p:sp>
+      </p:grpSp>
+      <p:cxnSp>
+        <p:nvCxnSpPr>
+          <p:cNvPr id="29" name="Conector recto de flecha 23">
+            <a:extLst>
+              <a:ext uri="{FF2B5EF4-FFF2-40B4-BE49-F238E27FC236}">
+                <a16:creationId xmlns:a16="http://schemas.microsoft.com/office/drawing/2014/main" id="{99BDC384-B1A0-D3B6-CBD1-D74F62EA6054}"/>
+              </a:ext>
+            </a:extLst>
+          </p:cNvPr>
+          <p:cNvCxnSpPr>
+            <a:cxnSpLocks/>
+            <a:stCxn id="19" idx="2"/>
+            <a:endCxn id="27" idx="0"/>
+          </p:cNvCxnSpPr>
+          <p:nvPr/>
+        </p:nvCxnSpPr>
+        <p:spPr>
+          <a:xfrm>
+            <a:off x="4547769" y="2759689"/>
+            <a:ext cx="0" cy="444227"/>
+          </a:xfrm>
+          <a:prstGeom prst="straightConnector1">
+            <a:avLst/>
+          </a:prstGeom>
+          <a:ln>
+            <a:tailEnd type="triangle"/>
+          </a:ln>
+        </p:spPr>
+        <p:style>
+          <a:lnRef idx="2">
+            <a:schemeClr val="accent1"/>
+          </a:lnRef>
+          <a:fillRef idx="0">
+            <a:schemeClr val="accent1"/>
+          </a:fillRef>
+          <a:effectRef idx="1">
+            <a:schemeClr val="accent1"/>
+          </a:effectRef>
+          <a:fontRef idx="minor">
+            <a:schemeClr val="tx1"/>
+          </a:fontRef>
+        </p:style>
+      </p:cxnSp>
+      <p:pic>
+        <p:nvPicPr>
+          <p:cNvPr id="2054" name="Picture 6" descr="SQLite">
+            <a:extLst>
+              <a:ext uri="{FF2B5EF4-FFF2-40B4-BE49-F238E27FC236}">
+                <a16:creationId xmlns:a16="http://schemas.microsoft.com/office/drawing/2014/main" id="{92C1547F-7CB4-B4B2-EFD4-DFBE61107611}"/>
+              </a:ext>
+            </a:extLst>
+          </p:cNvPr>
+          <p:cNvPicPr>
+            <a:picLocks noChangeAspect="1" noChangeArrowheads="1"/>
+          </p:cNvPicPr>
+          <p:nvPr/>
+        </p:nvPicPr>
+        <p:blipFill>
+          <a:blip r:embed="rId5">
+            <a:extLst>
+              <a:ext uri="{28A0092B-C50C-407E-A947-70E740481C1C}">
+                <a14:useLocalDpi xmlns:a14="http://schemas.microsoft.com/office/drawing/2010/main" val="0"/>
+              </a:ext>
+            </a:extLst>
+          </a:blip>
+          <a:srcRect/>
+          <a:stretch>
+            <a:fillRect/>
+          </a:stretch>
+        </p:blipFill>
+        <p:spPr bwMode="auto">
+          <a:xfrm>
+            <a:off x="3521982" y="3275083"/>
+            <a:ext cx="784382" cy="470629"/>
+          </a:xfrm>
+          <a:prstGeom prst="rect">
+            <a:avLst/>
+          </a:prstGeom>
+          <a:noFill/>
+          <a:extLst>
+            <a:ext uri="{909E8E84-426E-40DD-AFC4-6F175D3DCCD1}">
+              <a14:hiddenFill xmlns:a14="http://schemas.microsoft.com/office/drawing/2010/main">
+                <a:solidFill>
+                  <a:srgbClr val="FFFFFF"/>
+                </a:solidFill>
+              </a14:hiddenFill>
+            </a:ext>
+          </a:extLst>
+        </p:spPr>
+      </p:pic>
+    </p:spTree>
+    <p:extLst>
+      <p:ext uri="{BB962C8B-B14F-4D97-AF65-F5344CB8AC3E}">
+        <p14:creationId xmlns:p14="http://schemas.microsoft.com/office/powerpoint/2010/main" val="2247926836"/>
       </p:ext>
     </p:extLst>
   </p:cSld>

</xml_diff>